<commit_message>
Version 1p with colors
</commit_message>
<xml_diff>
--- a/TODO.pptx
+++ b/TODO.pptx
@@ -264,7 +264,7 @@
           <a:p>
             <a:fld id="{C031C33D-491B-4305-B8D8-D96C92FCCBD8}" type="datetimeFigureOut">
               <a:rPr lang="de-AT" smtClean="0"/>
-              <a:t>30.08.2021</a:t>
+              <a:t>31.08.2021</a:t>
             </a:fld>
             <a:endParaRPr lang="de-AT"/>
           </a:p>
@@ -464,7 +464,7 @@
           <a:p>
             <a:fld id="{C031C33D-491B-4305-B8D8-D96C92FCCBD8}" type="datetimeFigureOut">
               <a:rPr lang="de-AT" smtClean="0"/>
-              <a:t>30.08.2021</a:t>
+              <a:t>31.08.2021</a:t>
             </a:fld>
             <a:endParaRPr lang="de-AT"/>
           </a:p>
@@ -674,7 +674,7 @@
           <a:p>
             <a:fld id="{C031C33D-491B-4305-B8D8-D96C92FCCBD8}" type="datetimeFigureOut">
               <a:rPr lang="de-AT" smtClean="0"/>
-              <a:t>30.08.2021</a:t>
+              <a:t>31.08.2021</a:t>
             </a:fld>
             <a:endParaRPr lang="de-AT"/>
           </a:p>
@@ -874,7 +874,7 @@
           <a:p>
             <a:fld id="{C031C33D-491B-4305-B8D8-D96C92FCCBD8}" type="datetimeFigureOut">
               <a:rPr lang="de-AT" smtClean="0"/>
-              <a:t>30.08.2021</a:t>
+              <a:t>31.08.2021</a:t>
             </a:fld>
             <a:endParaRPr lang="de-AT"/>
           </a:p>
@@ -1150,7 +1150,7 @@
           <a:p>
             <a:fld id="{C031C33D-491B-4305-B8D8-D96C92FCCBD8}" type="datetimeFigureOut">
               <a:rPr lang="de-AT" smtClean="0"/>
-              <a:t>30.08.2021</a:t>
+              <a:t>31.08.2021</a:t>
             </a:fld>
             <a:endParaRPr lang="de-AT"/>
           </a:p>
@@ -1418,7 +1418,7 @@
           <a:p>
             <a:fld id="{C031C33D-491B-4305-B8D8-D96C92FCCBD8}" type="datetimeFigureOut">
               <a:rPr lang="de-AT" smtClean="0"/>
-              <a:t>30.08.2021</a:t>
+              <a:t>31.08.2021</a:t>
             </a:fld>
             <a:endParaRPr lang="de-AT"/>
           </a:p>
@@ -1833,7 +1833,7 @@
           <a:p>
             <a:fld id="{C031C33D-491B-4305-B8D8-D96C92FCCBD8}" type="datetimeFigureOut">
               <a:rPr lang="de-AT" smtClean="0"/>
-              <a:t>30.08.2021</a:t>
+              <a:t>31.08.2021</a:t>
             </a:fld>
             <a:endParaRPr lang="de-AT"/>
           </a:p>
@@ -1975,7 +1975,7 @@
           <a:p>
             <a:fld id="{C031C33D-491B-4305-B8D8-D96C92FCCBD8}" type="datetimeFigureOut">
               <a:rPr lang="de-AT" smtClean="0"/>
-              <a:t>30.08.2021</a:t>
+              <a:t>31.08.2021</a:t>
             </a:fld>
             <a:endParaRPr lang="de-AT"/>
           </a:p>
@@ -2088,7 +2088,7 @@
           <a:p>
             <a:fld id="{C031C33D-491B-4305-B8D8-D96C92FCCBD8}" type="datetimeFigureOut">
               <a:rPr lang="de-AT" smtClean="0"/>
-              <a:t>30.08.2021</a:t>
+              <a:t>31.08.2021</a:t>
             </a:fld>
             <a:endParaRPr lang="de-AT"/>
           </a:p>
@@ -2401,7 +2401,7 @@
           <a:p>
             <a:fld id="{C031C33D-491B-4305-B8D8-D96C92FCCBD8}" type="datetimeFigureOut">
               <a:rPr lang="de-AT" smtClean="0"/>
-              <a:t>30.08.2021</a:t>
+              <a:t>31.08.2021</a:t>
             </a:fld>
             <a:endParaRPr lang="de-AT"/>
           </a:p>
@@ -2690,7 +2690,7 @@
           <a:p>
             <a:fld id="{C031C33D-491B-4305-B8D8-D96C92FCCBD8}" type="datetimeFigureOut">
               <a:rPr lang="de-AT" smtClean="0"/>
-              <a:t>30.08.2021</a:t>
+              <a:t>31.08.2021</a:t>
             </a:fld>
             <a:endParaRPr lang="de-AT"/>
           </a:p>
@@ -2933,7 +2933,7 @@
           <a:p>
             <a:fld id="{C031C33D-491B-4305-B8D8-D96C92FCCBD8}" type="datetimeFigureOut">
               <a:rPr lang="de-AT" smtClean="0"/>
-              <a:t>30.08.2021</a:t>
+              <a:t>31.08.2021</a:t>
             </a:fld>
             <a:endParaRPr lang="de-AT"/>
           </a:p>
@@ -3736,7 +3736,7 @@
         </p:blipFill>
         <p:spPr>
           <a:xfrm>
-            <a:off x="6230281" y="2423282"/>
+            <a:off x="6366948" y="-1663967"/>
             <a:ext cx="4139795" cy="39974875"/>
           </a:xfrm>
           <a:prstGeom prst="rect">

</xml_diff>